<commit_message>
Edited to ensure replicability
</commit_message>
<xml_diff>
--- a/PPI_BBC_article.pptx
+++ b/PPI_BBC_article.pptx
@@ -113,6 +113,11 @@
       </a:defRPr>
     </a:lvl9pPr>
   </p:defaultTextStyle>
+  <p:extLst>
+    <p:ext uri="{EFAFB233-063F-42B5-8137-9DF3F51BA10A}">
+      <p15:sldGuideLst xmlns:p15="http://schemas.microsoft.com/office/powerpoint/2012/main"/>
+    </p:ext>
+  </p:extLst>
 </p:presentation>
 </file>
 
@@ -263,7 +268,7 @@
           <a:p>
             <a:fld id="{D571CC00-9F0D-4082-A63A-DB4E8F38CABF}" type="datetimeFigureOut">
               <a:rPr lang="it-IT" smtClean="0"/>
-              <a:t>21/04/2018</a:t>
+              <a:t>22/04/18</a:t>
             </a:fld>
             <a:endParaRPr lang="it-IT"/>
           </a:p>
@@ -461,7 +466,7 @@
           <a:p>
             <a:fld id="{D571CC00-9F0D-4082-A63A-DB4E8F38CABF}" type="datetimeFigureOut">
               <a:rPr lang="it-IT" smtClean="0"/>
-              <a:t>21/04/2018</a:t>
+              <a:t>22/04/18</a:t>
             </a:fld>
             <a:endParaRPr lang="it-IT"/>
           </a:p>
@@ -669,7 +674,7 @@
           <a:p>
             <a:fld id="{D571CC00-9F0D-4082-A63A-DB4E8F38CABF}" type="datetimeFigureOut">
               <a:rPr lang="it-IT" smtClean="0"/>
-              <a:t>21/04/2018</a:t>
+              <a:t>22/04/18</a:t>
             </a:fld>
             <a:endParaRPr lang="it-IT"/>
           </a:p>
@@ -867,7 +872,7 @@
           <a:p>
             <a:fld id="{D571CC00-9F0D-4082-A63A-DB4E8F38CABF}" type="datetimeFigureOut">
               <a:rPr lang="it-IT" smtClean="0"/>
-              <a:t>21/04/2018</a:t>
+              <a:t>22/04/18</a:t>
             </a:fld>
             <a:endParaRPr lang="it-IT"/>
           </a:p>
@@ -1142,7 +1147,7 @@
           <a:p>
             <a:fld id="{D571CC00-9F0D-4082-A63A-DB4E8F38CABF}" type="datetimeFigureOut">
               <a:rPr lang="it-IT" smtClean="0"/>
-              <a:t>21/04/2018</a:t>
+              <a:t>22/04/18</a:t>
             </a:fld>
             <a:endParaRPr lang="it-IT"/>
           </a:p>
@@ -1407,7 +1412,7 @@
           <a:p>
             <a:fld id="{D571CC00-9F0D-4082-A63A-DB4E8F38CABF}" type="datetimeFigureOut">
               <a:rPr lang="it-IT" smtClean="0"/>
-              <a:t>21/04/2018</a:t>
+              <a:t>22/04/18</a:t>
             </a:fld>
             <a:endParaRPr lang="it-IT"/>
           </a:p>
@@ -1819,7 +1824,7 @@
           <a:p>
             <a:fld id="{D571CC00-9F0D-4082-A63A-DB4E8F38CABF}" type="datetimeFigureOut">
               <a:rPr lang="it-IT" smtClean="0"/>
-              <a:t>21/04/2018</a:t>
+              <a:t>22/04/18</a:t>
             </a:fld>
             <a:endParaRPr lang="it-IT"/>
           </a:p>
@@ -1960,7 +1965,7 @@
           <a:p>
             <a:fld id="{D571CC00-9F0D-4082-A63A-DB4E8F38CABF}" type="datetimeFigureOut">
               <a:rPr lang="it-IT" smtClean="0"/>
-              <a:t>21/04/2018</a:t>
+              <a:t>22/04/18</a:t>
             </a:fld>
             <a:endParaRPr lang="it-IT"/>
           </a:p>
@@ -2073,7 +2078,7 @@
           <a:p>
             <a:fld id="{D571CC00-9F0D-4082-A63A-DB4E8F38CABF}" type="datetimeFigureOut">
               <a:rPr lang="it-IT" smtClean="0"/>
-              <a:t>21/04/2018</a:t>
+              <a:t>22/04/18</a:t>
             </a:fld>
             <a:endParaRPr lang="it-IT"/>
           </a:p>
@@ -2384,7 +2389,7 @@
           <a:p>
             <a:fld id="{D571CC00-9F0D-4082-A63A-DB4E8F38CABF}" type="datetimeFigureOut">
               <a:rPr lang="it-IT" smtClean="0"/>
-              <a:t>21/04/2018</a:t>
+              <a:t>22/04/18</a:t>
             </a:fld>
             <a:endParaRPr lang="it-IT"/>
           </a:p>
@@ -2672,7 +2677,7 @@
           <a:p>
             <a:fld id="{D571CC00-9F0D-4082-A63A-DB4E8F38CABF}" type="datetimeFigureOut">
               <a:rPr lang="it-IT" smtClean="0"/>
-              <a:t>21/04/2018</a:t>
+              <a:t>22/04/18</a:t>
             </a:fld>
             <a:endParaRPr lang="it-IT"/>
           </a:p>
@@ -2913,7 +2918,7 @@
           <a:p>
             <a:fld id="{D571CC00-9F0D-4082-A63A-DB4E8F38CABF}" type="datetimeFigureOut">
               <a:rPr lang="it-IT" smtClean="0"/>
-              <a:t>21/04/2018</a:t>
+              <a:t>22/04/18</a:t>
             </a:fld>
             <a:endParaRPr lang="it-IT"/>
           </a:p>
@@ -3566,7 +3571,7 @@
           <p:nvPr>
             <p:extLst>
               <p:ext uri="{D42A27DB-BD31-4B8C-83A1-F6EECF244321}">
-                <p14:modId xmlns:p14="http://schemas.microsoft.com/office/powerpoint/2010/main" val="378129824"/>
+                <p14:modId xmlns:p14="http://schemas.microsoft.com/office/powerpoint/2010/main" val="4039936685"/>
               </p:ext>
             </p:extLst>
           </p:nvPr>
@@ -3675,7 +3680,7 @@
                     <a:p>
                       <a:r>
                         <a:rPr lang="it-IT" dirty="0"/>
-                        <a:t>0.649</a:t>
+                        <a:t>0.642</a:t>
                       </a:r>
                     </a:p>
                   </a:txBody>
@@ -3849,7 +3854,7 @@
           <p:nvPr>
             <p:extLst>
               <p:ext uri="{D42A27DB-BD31-4B8C-83A1-F6EECF244321}">
-                <p14:modId xmlns:p14="http://schemas.microsoft.com/office/powerpoint/2010/main" val="3248449745"/>
+                <p14:modId xmlns:p14="http://schemas.microsoft.com/office/powerpoint/2010/main" val="866287681"/>
               </p:ext>
             </p:extLst>
           </p:nvPr>
@@ -3958,7 +3963,7 @@
                     <a:p>
                       <a:r>
                         <a:rPr lang="it-IT" dirty="0"/>
-                        <a:t>0.743</a:t>
+                        <a:t>0.512</a:t>
                       </a:r>
                     </a:p>
                   </a:txBody>
@@ -3971,7 +3976,7 @@
                     <a:p>
                       <a:r>
                         <a:rPr lang="it-IT" dirty="0"/>
-                        <a:t>0.648</a:t>
+                        <a:t>0.286</a:t>
                       </a:r>
                     </a:p>
                   </a:txBody>
@@ -3984,7 +3989,7 @@
                     <a:p>
                       <a:r>
                         <a:rPr lang="it-IT" dirty="0"/>
-                        <a:t>0.236</a:t>
+                        <a:t>0.773</a:t>
                       </a:r>
                     </a:p>
                   </a:txBody>
@@ -3997,7 +4002,7 @@
                     <a:p>
                       <a:r>
                         <a:rPr lang="it-IT" dirty="0"/>
-                        <a:t>0.835</a:t>
+                        <a:t>0.637</a:t>
                       </a:r>
                     </a:p>
                   </a:txBody>
@@ -4010,7 +4015,7 @@
                     <a:p>
                       <a:r>
                         <a:rPr lang="it-IT" dirty="0"/>
-                        <a:t>0.850</a:t>
+                        <a:t>0.662</a:t>
                       </a:r>
                     </a:p>
                   </a:txBody>
@@ -4023,7 +4028,7 @@
                     <a:p>
                       <a:r>
                         <a:rPr lang="it-IT" dirty="0"/>
-                        <a:t>0.861</a:t>
+                        <a:t>0.704</a:t>
                       </a:r>
                     </a:p>
                   </a:txBody>
@@ -4036,7 +4041,7 @@
                     <a:p>
                       <a:r>
                         <a:rPr lang="it-IT" dirty="0"/>
-                        <a:t>0.839</a:t>
+                        <a:t>0.984</a:t>
                       </a:r>
                     </a:p>
                   </a:txBody>
@@ -4049,7 +4054,7 @@
                     <a:p>
                       <a:r>
                         <a:rPr lang="it-IT" dirty="0"/>
-                        <a:t>0.638</a:t>
+                        <a:t>0.394</a:t>
                       </a:r>
                     </a:p>
                   </a:txBody>
@@ -4062,7 +4067,7 @@
                     <a:p>
                       <a:r>
                         <a:rPr lang="it-IT" dirty="0"/>
-                        <a:t>0.965</a:t>
+                        <a:t>0.845</a:t>
                       </a:r>
                     </a:p>
                   </a:txBody>
@@ -4075,7 +4080,7 @@
                     <a:p>
                       <a:r>
                         <a:rPr lang="it-IT" dirty="0"/>
-                        <a:t>0.713</a:t>
+                        <a:t>0.659</a:t>
                       </a:r>
                     </a:p>
                   </a:txBody>
@@ -4088,7 +4093,7 @@
                     <a:p>
                       <a:r>
                         <a:rPr lang="it-IT" dirty="0"/>
-                        <a:t>0.930</a:t>
+                        <a:t>0.700</a:t>
                       </a:r>
                     </a:p>
                   </a:txBody>
@@ -4101,7 +4106,7 @@
                     <a:p>
                       <a:r>
                         <a:rPr lang="it-IT" dirty="0"/>
-                        <a:t>0.441</a:t>
+                        <a:t>0.565</a:t>
                       </a:r>
                     </a:p>
                   </a:txBody>
@@ -6125,8 +6130,8 @@
           </a:p>
         </p:txBody>
       </p:sp>
-      <mc:AlternateContent xmlns:mc="http://schemas.openxmlformats.org/markup-compatibility/2006">
-        <mc:Choice xmlns:a14="http://schemas.microsoft.com/office/drawing/2010/main" Requires="a14">
+      <mc:AlternateContent xmlns:mc="http://schemas.openxmlformats.org/markup-compatibility/2006" xmlns:a14="http://schemas.microsoft.com/office/drawing/2010/main">
+        <mc:Choice Requires="a14">
           <p:sp>
             <p:nvSpPr>
               <p:cNvPr id="3" name="Segnaposto contenuto 2">
@@ -6199,40 +6204,56 @@
                     </m:oMathParaPr>
                     <m:oMath xmlns:m="http://schemas.openxmlformats.org/officeDocument/2006/math">
                       <m:r>
-                        <a:rPr lang="it-IT" i="1"/>
+                        <a:rPr lang="it-IT" i="1">
+                          <a:latin typeface="Cambria Math" panose="02040503050406030204" pitchFamily="18" charset="0"/>
+                        </a:rPr>
                         <m:t>𝑁𝐺𝐷</m:t>
                       </m:r>
                       <m:r>
-                        <a:rPr lang="it-IT" i="1"/>
+                        <a:rPr lang="it-IT" i="1">
+                          <a:latin typeface="Cambria Math" panose="02040503050406030204" pitchFamily="18" charset="0"/>
+                        </a:rPr>
                         <m:t>(</m:t>
                       </m:r>
                       <m:r>
-                        <a:rPr lang="it-IT" i="1"/>
+                        <a:rPr lang="it-IT" i="1">
+                          <a:latin typeface="Cambria Math" panose="02040503050406030204" pitchFamily="18" charset="0"/>
+                        </a:rPr>
                         <m:t>𝑥</m:t>
                       </m:r>
                       <m:r>
-                        <a:rPr lang="it-IT" i="1"/>
+                        <a:rPr lang="it-IT" i="1">
+                          <a:latin typeface="Cambria Math" panose="02040503050406030204" pitchFamily="18" charset="0"/>
+                        </a:rPr>
                         <m:t>,</m:t>
                       </m:r>
                       <m:r>
-                        <a:rPr lang="it-IT" i="1"/>
+                        <a:rPr lang="it-IT" i="1">
+                          <a:latin typeface="Cambria Math" panose="02040503050406030204" pitchFamily="18" charset="0"/>
+                        </a:rPr>
                         <m:t>𝑦</m:t>
                       </m:r>
                       <m:r>
-                        <a:rPr lang="it-IT" i="1"/>
+                        <a:rPr lang="it-IT" i="1">
+                          <a:latin typeface="Cambria Math" panose="02040503050406030204" pitchFamily="18" charset="0"/>
+                        </a:rPr>
                         <m:t>)=</m:t>
                       </m:r>
                       <m:f>
                         <m:fPr>
                           <m:ctrlPr>
-                            <a:rPr lang="it-IT" i="1"/>
+                            <a:rPr lang="it-IT" i="1">
+                              <a:latin typeface="Cambria Math" panose="02040503050406030204" pitchFamily="18" charset="0"/>
+                            </a:rPr>
                           </m:ctrlPr>
                         </m:fPr>
                         <m:num>
                           <m:func>
                             <m:funcPr>
                               <m:ctrlPr>
-                                <a:rPr lang="it-IT" i="1"/>
+                                <a:rPr lang="it-IT" i="1">
+                                  <a:latin typeface="Cambria Math" panose="02040503050406030204" pitchFamily="18" charset="0"/>
+                                </a:rPr>
                               </m:ctrlPr>
                             </m:funcPr>
                             <m:fName>
@@ -6240,7 +6261,9 @@
                                 <m:rPr>
                                   <m:sty m:val="p"/>
                                 </m:rPr>
-                                <a:rPr lang="it-IT"/>
+                                <a:rPr lang="it-IT">
+                                  <a:latin typeface="Cambria Math" panose="02040503050406030204" pitchFamily="18" charset="0"/>
+                                </a:rPr>
                                 <m:t>max</m:t>
                               </m:r>
                             </m:fName>
@@ -6250,14 +6273,18 @@
                                   <m:begChr m:val="{"/>
                                   <m:endChr m:val="}"/>
                                   <m:ctrlPr>
-                                    <a:rPr lang="it-IT" i="1"/>
+                                    <a:rPr lang="it-IT" i="1">
+                                      <a:latin typeface="Cambria Math" panose="02040503050406030204" pitchFamily="18" charset="0"/>
+                                    </a:rPr>
                                   </m:ctrlPr>
                                 </m:dPr>
                                 <m:e>
                                   <m:func>
                                     <m:funcPr>
                                       <m:ctrlPr>
-                                        <a:rPr lang="it-IT" i="1"/>
+                                        <a:rPr lang="it-IT" i="1">
+                                          <a:latin typeface="Cambria Math" panose="02040503050406030204" pitchFamily="18" charset="0"/>
+                                        </a:rPr>
                                       </m:ctrlPr>
                                     </m:funcPr>
                                     <m:fName>
@@ -6265,24 +6292,32 @@
                                         <m:rPr>
                                           <m:sty m:val="p"/>
                                         </m:rPr>
-                                        <a:rPr lang="it-IT"/>
+                                        <a:rPr lang="it-IT">
+                                          <a:latin typeface="Cambria Math" panose="02040503050406030204" pitchFamily="18" charset="0"/>
+                                        </a:rPr>
                                         <m:t>log</m:t>
                                       </m:r>
                                     </m:fName>
                                     <m:e>
                                       <m:r>
-                                        <a:rPr lang="it-IT" i="1"/>
+                                        <a:rPr lang="it-IT" i="1">
+                                          <a:latin typeface="Cambria Math" panose="02040503050406030204" pitchFamily="18" charset="0"/>
+                                        </a:rPr>
                                         <m:t>𝑓</m:t>
                                       </m:r>
                                       <m:d>
                                         <m:dPr>
                                           <m:ctrlPr>
-                                            <a:rPr lang="it-IT" i="1"/>
+                                            <a:rPr lang="it-IT" i="1">
+                                              <a:latin typeface="Cambria Math" panose="02040503050406030204" pitchFamily="18" charset="0"/>
+                                            </a:rPr>
                                           </m:ctrlPr>
                                         </m:dPr>
                                         <m:e>
                                           <m:r>
-                                            <a:rPr lang="it-IT" i="1"/>
+                                            <a:rPr lang="it-IT" i="1">
+                                              <a:latin typeface="Cambria Math" panose="02040503050406030204" pitchFamily="18" charset="0"/>
+                                            </a:rPr>
                                             <m:t>𝑥</m:t>
                                           </m:r>
                                         </m:e>
@@ -6290,22 +6325,30 @@
                                     </m:e>
                                   </m:func>
                                   <m:r>
-                                    <a:rPr lang="it-IT" i="1"/>
+                                    <a:rPr lang="it-IT" i="1">
+                                      <a:latin typeface="Cambria Math" panose="02040503050406030204" pitchFamily="18" charset="0"/>
+                                    </a:rPr>
                                     <m:t>, </m:t>
                                   </m:r>
                                   <m:r>
-                                    <a:rPr lang="it-IT" i="1"/>
+                                    <a:rPr lang="it-IT" i="1">
+                                      <a:latin typeface="Cambria Math" panose="02040503050406030204" pitchFamily="18" charset="0"/>
+                                    </a:rPr>
                                     <m:t>𝑙𝑜𝑔𝑓</m:t>
                                   </m:r>
                                   <m:d>
                                     <m:dPr>
                                       <m:ctrlPr>
-                                        <a:rPr lang="it-IT" i="1"/>
+                                        <a:rPr lang="it-IT" i="1">
+                                          <a:latin typeface="Cambria Math" panose="02040503050406030204" pitchFamily="18" charset="0"/>
+                                        </a:rPr>
                                       </m:ctrlPr>
                                     </m:dPr>
                                     <m:e>
                                       <m:r>
-                                        <a:rPr lang="it-IT" i="1"/>
+                                        <a:rPr lang="it-IT" i="1">
+                                          <a:latin typeface="Cambria Math" panose="02040503050406030204" pitchFamily="18" charset="0"/>
+                                        </a:rPr>
                                         <m:t>𝑦</m:t>
                                       </m:r>
                                     </m:e>
@@ -6315,79 +6358,111 @@
                             </m:e>
                           </m:func>
                           <m:r>
-                            <a:rPr lang="it-IT" i="1"/>
+                            <a:rPr lang="it-IT" i="1">
+                              <a:latin typeface="Cambria Math" panose="02040503050406030204" pitchFamily="18" charset="0"/>
+                            </a:rPr>
                             <m:t>−</m:t>
                           </m:r>
                           <m:r>
-                            <a:rPr lang="it-IT" i="1"/>
+                            <a:rPr lang="it-IT" i="1">
+                              <a:latin typeface="Cambria Math" panose="02040503050406030204" pitchFamily="18" charset="0"/>
+                            </a:rPr>
                             <m:t>𝑙𝑜𝑔𝑓</m:t>
                           </m:r>
                           <m:r>
-                            <a:rPr lang="it-IT" i="1"/>
+                            <a:rPr lang="it-IT" i="1">
+                              <a:latin typeface="Cambria Math" panose="02040503050406030204" pitchFamily="18" charset="0"/>
+                            </a:rPr>
                             <m:t>(</m:t>
                           </m:r>
                           <m:r>
-                            <a:rPr lang="it-IT" i="1"/>
+                            <a:rPr lang="it-IT" i="1">
+                              <a:latin typeface="Cambria Math" panose="02040503050406030204" pitchFamily="18" charset="0"/>
+                            </a:rPr>
                             <m:t>𝑥</m:t>
                           </m:r>
                           <m:r>
-                            <a:rPr lang="it-IT" i="1"/>
+                            <a:rPr lang="it-IT" i="1">
+                              <a:latin typeface="Cambria Math" panose="02040503050406030204" pitchFamily="18" charset="0"/>
+                            </a:rPr>
                             <m:t>,</m:t>
                           </m:r>
                           <m:r>
-                            <a:rPr lang="it-IT" i="1"/>
+                            <a:rPr lang="it-IT" i="1">
+                              <a:latin typeface="Cambria Math" panose="02040503050406030204" pitchFamily="18" charset="0"/>
+                            </a:rPr>
                             <m:t>𝑦</m:t>
                           </m:r>
                           <m:r>
-                            <a:rPr lang="it-IT" i="1"/>
+                            <a:rPr lang="it-IT" i="1">
+                              <a:latin typeface="Cambria Math" panose="02040503050406030204" pitchFamily="18" charset="0"/>
+                            </a:rPr>
                             <m:t>)</m:t>
                           </m:r>
                         </m:num>
                         <m:den>
                           <m:r>
-                            <a:rPr lang="it-IT" i="1"/>
+                            <a:rPr lang="it-IT" i="1">
+                              <a:latin typeface="Cambria Math" panose="02040503050406030204" pitchFamily="18" charset="0"/>
+                            </a:rPr>
                             <m:t>𝑙𝑜𝑔𝑁</m:t>
                           </m:r>
                           <m:r>
-                            <a:rPr lang="it-IT" i="1"/>
+                            <a:rPr lang="it-IT" i="1">
+                              <a:latin typeface="Cambria Math" panose="02040503050406030204" pitchFamily="18" charset="0"/>
+                            </a:rPr>
                             <m:t>−</m:t>
                           </m:r>
                           <m:r>
                             <m:rPr>
                               <m:sty m:val="p"/>
                             </m:rPr>
-                            <a:rPr lang="it-IT"/>
+                            <a:rPr lang="it-IT">
+                              <a:latin typeface="Cambria Math" panose="02040503050406030204" pitchFamily="18" charset="0"/>
+                            </a:rPr>
                             <m:t>min</m:t>
                           </m:r>
                           <m:r>
-                            <a:rPr lang="it-IT" i="1"/>
+                            <a:rPr lang="it-IT" i="1">
+                              <a:latin typeface="Cambria Math" panose="02040503050406030204" pitchFamily="18" charset="0"/>
+                            </a:rPr>
                             <m:t>{</m:t>
                           </m:r>
                           <m:r>
-                            <a:rPr lang="it-IT" i="1"/>
+                            <a:rPr lang="it-IT" i="1">
+                              <a:latin typeface="Cambria Math" panose="02040503050406030204" pitchFamily="18" charset="0"/>
+                            </a:rPr>
                             <m:t>𝑙𝑜𝑔𝑓</m:t>
                           </m:r>
                           <m:d>
                             <m:dPr>
                               <m:ctrlPr>
-                                <a:rPr lang="it-IT" i="1"/>
+                                <a:rPr lang="it-IT" i="1">
+                                  <a:latin typeface="Cambria Math" panose="02040503050406030204" pitchFamily="18" charset="0"/>
+                                </a:rPr>
                               </m:ctrlPr>
                             </m:dPr>
                             <m:e>
                               <m:r>
-                                <a:rPr lang="it-IT" i="1"/>
+                                <a:rPr lang="it-IT" i="1">
+                                  <a:latin typeface="Cambria Math" panose="02040503050406030204" pitchFamily="18" charset="0"/>
+                                </a:rPr>
                                 <m:t>𝑥</m:t>
                               </m:r>
                             </m:e>
                           </m:d>
                           <m:r>
-                            <a:rPr lang="it-IT" i="1"/>
+                            <a:rPr lang="it-IT" i="1">
+                              <a:latin typeface="Cambria Math" panose="02040503050406030204" pitchFamily="18" charset="0"/>
+                            </a:rPr>
                             <m:t>,</m:t>
                           </m:r>
                           <m:func>
                             <m:funcPr>
                               <m:ctrlPr>
-                                <a:rPr lang="it-IT" i="1"/>
+                                <a:rPr lang="it-IT" i="1">
+                                  <a:latin typeface="Cambria Math" panose="02040503050406030204" pitchFamily="18" charset="0"/>
+                                </a:rPr>
                               </m:ctrlPr>
                             </m:funcPr>
                             <m:fName>
@@ -6395,24 +6470,32 @@
                                 <m:rPr>
                                   <m:sty m:val="p"/>
                                 </m:rPr>
-                                <a:rPr lang="it-IT"/>
+                                <a:rPr lang="it-IT">
+                                  <a:latin typeface="Cambria Math" panose="02040503050406030204" pitchFamily="18" charset="0"/>
+                                </a:rPr>
                                 <m:t>log</m:t>
                               </m:r>
                             </m:fName>
                             <m:e>
                               <m:r>
-                                <a:rPr lang="it-IT" i="1"/>
+                                <a:rPr lang="it-IT" i="1">
+                                  <a:latin typeface="Cambria Math" panose="02040503050406030204" pitchFamily="18" charset="0"/>
+                                </a:rPr>
                                 <m:t>𝑓</m:t>
                               </m:r>
                               <m:d>
                                 <m:dPr>
                                   <m:ctrlPr>
-                                    <a:rPr lang="it-IT" i="1"/>
+                                    <a:rPr lang="it-IT" i="1">
+                                      <a:latin typeface="Cambria Math" panose="02040503050406030204" pitchFamily="18" charset="0"/>
+                                    </a:rPr>
                                   </m:ctrlPr>
                                 </m:dPr>
                                 <m:e>
                                   <m:r>
-                                    <a:rPr lang="it-IT" i="1"/>
+                                    <a:rPr lang="it-IT" i="1">
+                                      <a:latin typeface="Cambria Math" panose="02040503050406030204" pitchFamily="18" charset="0"/>
+                                    </a:rPr>
                                     <m:t>𝑦</m:t>
                                   </m:r>
                                 </m:e>
@@ -6420,7 +6503,9 @@
                             </m:e>
                           </m:func>
                           <m:r>
-                            <a:rPr lang="it-IT" i="1"/>
+                            <a:rPr lang="it-IT" i="1">
+                              <a:latin typeface="Cambria Math" panose="02040503050406030204" pitchFamily="18" charset="0"/>
+                            </a:rPr>
                             <m:t>}</m:t>
                           </m:r>
                         </m:den>
@@ -6485,7 +6570,7 @@
             </p:txBody>
           </p:sp>
         </mc:Choice>
-        <mc:Fallback>
+        <mc:Fallback xmlns="">
           <p:sp>
             <p:nvSpPr>
               <p:cNvPr id="3" name="Segnaposto contenuto 2">

</xml_diff>